<commit_message>
Contest practice 26 MAR 2022
</commit_message>
<xml_diff>
--- a/MS Office Files/opening screen.pptx
+++ b/MS Office Files/opening screen.pptx
@@ -449,7 +449,7 @@
             <a:fld id="{5923F103-BC34-4FE4-A40E-EDDEECFDA5D0}" type="datetimeFigureOut">
               <a:rPr lang="en-US" dirty="0"/>
               <a:pPr/>
-              <a:t>2/20/21</a:t>
+              <a:t>9/11/21</a:t>
             </a:fld>
             <a:endParaRPr lang="en-US" dirty="0"/>
           </a:p>
@@ -1545,7 +1545,7 @@
           <a:p>
             <a:fld id="{923A1CC3-2375-41D4-9E03-427CAF2A4C1A}" type="datetimeFigureOut">
               <a:rPr lang="en-US" dirty="0"/>
-              <a:t>2/20/21</a:t>
+              <a:t>9/11/21</a:t>
             </a:fld>
             <a:endParaRPr lang="en-US" dirty="0"/>
           </a:p>
@@ -2533,7 +2533,7 @@
           <a:p>
             <a:fld id="{AFF16868-8199-4C2C-A5B1-63AEE139F88E}" type="datetimeFigureOut">
               <a:rPr lang="en-US" dirty="0"/>
-              <a:t>2/20/21</a:t>
+              <a:t>9/11/21</a:t>
             </a:fld>
             <a:endParaRPr lang="en-US" dirty="0"/>
           </a:p>
@@ -3675,7 +3675,7 @@
           <a:p>
             <a:fld id="{AAD9FF7F-6988-44CC-821B-644E70CD2F73}" type="datetimeFigureOut">
               <a:rPr lang="en-US" dirty="0"/>
-              <a:t>2/20/21</a:t>
+              <a:t>9/11/21</a:t>
             </a:fld>
             <a:endParaRPr lang="en-US" dirty="0"/>
           </a:p>
@@ -4716,7 +4716,7 @@
           <a:p>
             <a:fld id="{5C12C299-16B2-4475-990D-751901EACC14}" type="datetimeFigureOut">
               <a:rPr lang="en-US" dirty="0"/>
-              <a:t>2/20/21</a:t>
+              <a:t>9/11/21</a:t>
             </a:fld>
             <a:endParaRPr lang="en-US" dirty="0"/>
           </a:p>
@@ -5384,7 +5384,7 @@
           <a:p>
             <a:fld id="{9FE86839-B9D8-4651-8783-F325ECE74E65}" type="datetimeFigureOut">
               <a:rPr lang="en-US" dirty="0"/>
-              <a:t>2/20/21</a:t>
+              <a:t>9/11/21</a:t>
             </a:fld>
             <a:endParaRPr lang="en-US" dirty="0"/>
           </a:p>
@@ -6253,7 +6253,7 @@
           <a:p>
             <a:fld id="{FD484F64-32F6-45C5-931F-ADC1662401D0}" type="datetimeFigureOut">
               <a:rPr lang="en-US" dirty="0"/>
-              <a:t>2/20/21</a:t>
+              <a:t>9/11/21</a:t>
             </a:fld>
             <a:endParaRPr lang="en-US" dirty="0"/>
           </a:p>
@@ -6451,7 +6451,7 @@
           <a:p>
             <a:fld id="{53086D93-FCAC-47E0-A2EE-787E62CA814C}" type="datetimeFigureOut">
               <a:rPr lang="en-US" dirty="0"/>
-              <a:t>2/20/21</a:t>
+              <a:t>9/11/21</a:t>
             </a:fld>
             <a:endParaRPr lang="en-US" dirty="0"/>
           </a:p>
@@ -7431,7 +7431,7 @@
           <a:p>
             <a:fld id="{CDA879A6-0FD0-4734-A311-86BFCA472E6E}" type="datetimeFigureOut">
               <a:rPr lang="en-US" dirty="0"/>
-              <a:t>2/20/21</a:t>
+              <a:t>9/11/21</a:t>
             </a:fld>
             <a:endParaRPr lang="en-US" dirty="0"/>
           </a:p>
@@ -7650,7 +7650,7 @@
           <a:p>
             <a:fld id="{19C9CA7B-DFD4-44B5-8C60-D14B8CD1FB59}" type="datetimeFigureOut">
               <a:rPr lang="en-US" dirty="0"/>
-              <a:t>2/20/21</a:t>
+              <a:t>9/11/21</a:t>
             </a:fld>
             <a:endParaRPr lang="en-US" dirty="0"/>
           </a:p>
@@ -8692,7 +8692,7 @@
           <a:p>
             <a:fld id="{F34E6425-0181-43F2-84FC-787E803FD2F8}" type="datetimeFigureOut">
               <a:rPr lang="en-US" dirty="0"/>
-              <a:t>2/20/21</a:t>
+              <a:t>9/11/21</a:t>
             </a:fld>
             <a:endParaRPr lang="en-US" dirty="0"/>
           </a:p>
@@ -8972,7 +8972,7 @@
           <a:p>
             <a:fld id="{3BDB8791-F1B0-41E7-B7FD-A781E65C4266}" type="datetimeFigureOut">
               <a:rPr lang="en-US" dirty="0"/>
-              <a:t>2/20/21</a:t>
+              <a:t>9/11/21</a:t>
             </a:fld>
             <a:endParaRPr lang="en-US" dirty="0"/>
           </a:p>
@@ -9390,7 +9390,7 @@
           <a:p>
             <a:fld id="{5FDD63B2-E120-4ED8-B27B-C685F510A5FE}" type="datetimeFigureOut">
               <a:rPr lang="en-US" dirty="0"/>
-              <a:t>2/20/21</a:t>
+              <a:t>9/11/21</a:t>
             </a:fld>
             <a:endParaRPr lang="en-US" dirty="0"/>
           </a:p>
@@ -9525,7 +9525,7 @@
           <a:p>
             <a:fld id="{7AA18ACC-A947-437B-A130-35BD54FDF1E9}" type="datetimeFigureOut">
               <a:rPr lang="en-US" dirty="0"/>
-              <a:t>2/20/21</a:t>
+              <a:t>9/11/21</a:t>
             </a:fld>
             <a:endParaRPr lang="en-US" dirty="0"/>
           </a:p>
@@ -9628,7 +9628,7 @@
           <a:p>
             <a:fld id="{7C8D7E02-BCB8-4D50-A234-369438C08659}" type="datetimeFigureOut">
               <a:rPr lang="en-US" dirty="0"/>
-              <a:t>2/20/21</a:t>
+              <a:t>9/11/21</a:t>
             </a:fld>
             <a:endParaRPr lang="en-US" dirty="0"/>
           </a:p>
@@ -10717,7 +10717,7 @@
           <a:p>
             <a:fld id="{76E86A4C-8E40-4F87-A4F0-01A0687C5742}" type="datetimeFigureOut">
               <a:rPr lang="en-US" dirty="0"/>
-              <a:t>2/20/21</a:t>
+              <a:t>9/11/21</a:t>
             </a:fld>
             <a:endParaRPr lang="en-US" dirty="0"/>
           </a:p>
@@ -11833,7 +11833,7 @@
           <a:p>
             <a:fld id="{35E72C73-2D91-4E12-BA25-F0AA0C03599B}" type="datetimeFigureOut">
               <a:rPr lang="en-US" dirty="0"/>
-              <a:t>2/20/21</a:t>
+              <a:t>9/11/21</a:t>
             </a:fld>
             <a:endParaRPr lang="en-US" dirty="0"/>
           </a:p>
@@ -12838,7 +12838,7 @@
           <a:p>
             <a:fld id="{2BE451C3-0FF4-47C4-B829-773ADF60F88C}" type="datetimeFigureOut">
               <a:rPr lang="en-US" dirty="0"/>
-              <a:t>2/20/21</a:t>
+              <a:t>9/11/21</a:t>
             </a:fld>
             <a:endParaRPr lang="en-US" dirty="0"/>
           </a:p>
@@ -13433,9 +13433,10 @@
           <a:lstStyle/>
           <a:p>
             <a:r>
-              <a:rPr lang="en-US" dirty="0"/>
+              <a:rPr lang="en-US"/>
               <a:t>Saturday           Club</a:t>
             </a:r>
+            <a:endParaRPr lang="en-US" dirty="0"/>
           </a:p>
         </p:txBody>
       </p:sp>
@@ -13467,9 +13468,10 @@
           <a:p>
             <a:pPr algn="r"/>
             <a:r>
-              <a:rPr lang="en-US" dirty="0"/>
+              <a:rPr lang="en-US"/>
               <a:t>LOYOLA UNIVERSITY CHICAGO</a:t>
             </a:r>
+            <a:endParaRPr lang="en-US" dirty="0"/>
           </a:p>
         </p:txBody>
       </p:sp>
@@ -13753,16 +13755,17 @@
             <a:pPr algn="r"/>
             <a:fld id="{92531C46-8D05-184E-B2A6-3F4A9A28DEAA}" type="datetime2">
               <a:rPr lang="en-US" b="1" cap="none" smtClean="0"/>
-              <a:t>Saturday, February 20, 2021</a:t>
+              <a:t>Saturday, September 11, 2021</a:t>
             </a:fld>
-            <a:endParaRPr lang="en-US" b="1" cap="none" dirty="0"/>
+            <a:endParaRPr lang="en-US" b="1" cap="none"/>
           </a:p>
           <a:p>
             <a:pPr algn="r"/>
             <a:r>
-              <a:rPr lang="en-US" b="1" cap="none" dirty="0"/>
+              <a:rPr lang="en-US" b="1" cap="none"/>
               <a:t>9 a.m.</a:t>
             </a:r>
+            <a:endParaRPr lang="en-US" b="1" cap="none" dirty="0"/>
           </a:p>
         </p:txBody>
       </p:sp>

</xml_diff>